<commit_message>
Add comment to UseCase_5_Graphical_User_Interface, about display update requiring use of Show method.
</commit_message>
<xml_diff>
--- a/Notebooks/EngineeringNotebook/MS-PowerPoint-Files/tsWxGTUI_PyVx/UseCase_5_Graphical_User_Interface.pptx
+++ b/Notebooks/EngineeringNotebook/MS-PowerPoint-Files/tsWxGTUI_PyVx/UseCase_5_Graphical_User_Interface.pptx
@@ -306,7 +306,7 @@
               <a:pPr>
                 <a:defRPr/>
               </a:pPr>
-              <a:t>11/29/2015</a:t>
+              <a:t>12/2/2015</a:t>
             </a:fld>
             <a:endParaRPr lang="en-US"/>
           </a:p>
@@ -543,7 +543,7 @@
               <a:pPr>
                 <a:defRPr/>
               </a:pPr>
-              <a:t>11/29/2015</a:t>
+              <a:t>12/2/2015</a:t>
             </a:fld>
             <a:endParaRPr lang="en-US"/>
           </a:p>
@@ -2662,7 +2662,7 @@
             </a:pPr>
             <a:fld id="{B5B52024-79AA-4062-8229-397D9E214550}" type="datetime1">
               <a:rPr lang="en-US" smtClean="0"/>
-              <a:t>11/29/2015</a:t>
+              <a:t>12/2/2015</a:t>
             </a:fld>
             <a:endParaRPr lang="en-US"/>
           </a:p>
@@ -2868,7 +2868,7 @@
             </a:pPr>
             <a:fld id="{5534B48B-48D4-4D1F-B98F-2ED8E1B04ED0}" type="datetime1">
               <a:rPr lang="en-US" smtClean="0"/>
-              <a:t>11/29/2015</a:t>
+              <a:t>12/2/2015</a:t>
             </a:fld>
             <a:endParaRPr lang="en-US"/>
           </a:p>
@@ -3070,7 +3070,7 @@
             </a:pPr>
             <a:fld id="{C3557E2B-7DD4-4DCF-9DDD-7786167218C6}" type="datetime1">
               <a:rPr lang="en-US" smtClean="0"/>
-              <a:t>11/29/2015</a:t>
+              <a:t>12/2/2015</a:t>
             </a:fld>
             <a:endParaRPr lang="en-US"/>
           </a:p>
@@ -3262,7 +3262,7 @@
             </a:pPr>
             <a:fld id="{65B11A62-63AA-4067-ACEB-AA6A42CE3A38}" type="datetime1">
               <a:rPr lang="en-US" smtClean="0"/>
-              <a:t>11/29/2015</a:t>
+              <a:t>12/2/2015</a:t>
             </a:fld>
             <a:endParaRPr lang="en-US"/>
           </a:p>
@@ -3477,7 +3477,7 @@
             </a:pPr>
             <a:fld id="{013FB6F9-CFEF-47AA-A08B-D90CED01DE9A}" type="datetime1">
               <a:rPr lang="en-US" smtClean="0"/>
-              <a:t>11/29/2015</a:t>
+              <a:t>12/2/2015</a:t>
             </a:fld>
             <a:endParaRPr lang="en-US"/>
           </a:p>
@@ -3786,7 +3786,7 @@
             </a:pPr>
             <a:fld id="{44D06F95-D493-494F-B0EB-3EDFAA385886}" type="datetime1">
               <a:rPr lang="en-US" smtClean="0"/>
-              <a:t>11/29/2015</a:t>
+              <a:t>12/2/2015</a:t>
             </a:fld>
             <a:endParaRPr lang="en-US"/>
           </a:p>
@@ -4234,7 +4234,7 @@
             </a:pPr>
             <a:fld id="{26FA81D3-96E1-4758-9306-72CE9F6E2F25}" type="datetime1">
               <a:rPr lang="en-US" smtClean="0"/>
-              <a:t>11/29/2015</a:t>
+              <a:t>12/2/2015</a:t>
             </a:fld>
             <a:endParaRPr lang="en-US"/>
           </a:p>
@@ -4375,7 +4375,7 @@
             </a:pPr>
             <a:fld id="{C22C02A3-FDB2-4B02-8110-311DDD8475C2}" type="datetime1">
               <a:rPr lang="en-US" smtClean="0"/>
-              <a:t>11/29/2015</a:t>
+              <a:t>12/2/2015</a:t>
             </a:fld>
             <a:endParaRPr lang="en-US"/>
           </a:p>
@@ -4492,7 +4492,7 @@
             </a:pPr>
             <a:fld id="{FB277746-3C8E-4161-A66B-B97D4FD5213A}" type="datetime1">
               <a:rPr lang="en-US" smtClean="0"/>
-              <a:t>11/29/2015</a:t>
+              <a:t>12/2/2015</a:t>
             </a:fld>
             <a:endParaRPr lang="en-US"/>
           </a:p>
@@ -4786,7 +4786,7 @@
             </a:pPr>
             <a:fld id="{86B778C6-FEB5-4910-BBA7-BBA76466D3B2}" type="datetime1">
               <a:rPr lang="en-US" smtClean="0"/>
-              <a:t>11/29/2015</a:t>
+              <a:t>12/2/2015</a:t>
             </a:fld>
             <a:endParaRPr lang="en-US"/>
           </a:p>
@@ -5063,7 +5063,7 @@
             </a:pPr>
             <a:fld id="{7A68BEE5-7335-4799-9F53-F65CFD274630}" type="datetime1">
               <a:rPr lang="en-US" smtClean="0"/>
-              <a:t>11/29/2015</a:t>
+              <a:t>12/2/2015</a:t>
             </a:fld>
             <a:endParaRPr lang="en-US"/>
           </a:p>
@@ -5597,7 +5597,7 @@
             </a:pPr>
             <a:fld id="{45A933D1-86C7-45FF-B83F-CA5ED825AD11}" type="datetime1">
               <a:rPr lang="en-US" smtClean="0"/>
-              <a:t>11/29/2015</a:t>
+              <a:t>12/2/2015</a:t>
             </a:fld>
             <a:endParaRPr lang="en-US"/>
           </a:p>
@@ -6237,7 +6237,7 @@
           <a:p>
             <a:fld id="{878D0E70-D567-4EAD-BEEC-D30EFDF84A73}" type="datetime1">
               <a:rPr lang="en-US" smtClean="0"/>
-              <a:t>11/29/2015</a:t>
+              <a:t>12/2/2015</a:t>
             </a:fld>
             <a:endParaRPr lang="en-US" smtClean="0"/>
           </a:p>
@@ -6497,7 +6497,7 @@
             </a:pPr>
             <a:fld id="{44D06F95-D493-494F-B0EB-3EDFAA385886}" type="datetime1">
               <a:rPr lang="en-US" smtClean="0"/>
-              <a:t>11/29/2015</a:t>
+              <a:t>12/2/2015</a:t>
             </a:fld>
             <a:endParaRPr lang="en-US"/>
           </a:p>
@@ -7305,7 +7305,7 @@
           <a:p>
             <a:fld id="{82CC87A2-1781-440A-9FCF-DC78272C75A5}" type="datetime1">
               <a:rPr lang="en-US" smtClean="0"/>
-              <a:t>11/29/2015</a:t>
+              <a:t>12/2/2015</a:t>
             </a:fld>
             <a:endParaRPr lang="en-US" dirty="0" smtClean="0"/>
           </a:p>
@@ -7941,7 +7941,7 @@
           <a:p>
             <a:fld id="{82CC87A2-1781-440A-9FCF-DC78272C75A5}" type="datetime1">
               <a:rPr lang="en-US" smtClean="0"/>
-              <a:t>11/29/2015</a:t>
+              <a:t>12/2/2015</a:t>
             </a:fld>
             <a:endParaRPr lang="en-US" dirty="0" smtClean="0"/>
           </a:p>
@@ -8599,7 +8599,7 @@
           <a:p>
             <a:fld id="{82CC87A2-1781-440A-9FCF-DC78272C75A5}" type="datetime1">
               <a:rPr lang="en-US" smtClean="0"/>
-              <a:t>11/29/2015</a:t>
+              <a:t>12/2/2015</a:t>
             </a:fld>
             <a:endParaRPr lang="en-US" dirty="0" smtClean="0"/>
           </a:p>
@@ -9144,11 +9144,7 @@
             </a:r>
             <a:r>
               <a:rPr lang="en-US" sz="1200" dirty="0" smtClean="0"/>
-              <a:t> </a:t>
-            </a:r>
-            <a:r>
-              <a:rPr lang="en-US" sz="1200" dirty="0" smtClean="0"/>
-              <a:t>2.8.9.2 Color16DataBase.py</a:t>
+              <a:t> 2.8.9.2 Color16DataBase.py</a:t>
             </a:r>
             <a:endParaRPr lang="en-US" sz="1200" dirty="0"/>
           </a:p>
@@ -9164,11 +9160,7 @@
             </a:r>
             <a:r>
               <a:rPr lang="en-US" sz="1200" dirty="0" smtClean="0"/>
-              <a:t> </a:t>
-            </a:r>
-            <a:r>
-              <a:rPr lang="en-US" sz="1200" dirty="0" smtClean="0"/>
-              <a:t>2.8.9.2 Color16SubstitutionMap.py</a:t>
+              <a:t> 2.8.9.2 Color16SubstitutionMap.py</a:t>
             </a:r>
             <a:endParaRPr lang="en-US" sz="1200" dirty="0"/>
           </a:p>
@@ -9184,11 +9176,7 @@
             </a:r>
             <a:r>
               <a:rPr lang="en-US" sz="1200" dirty="0" smtClean="0"/>
-              <a:t> </a:t>
-            </a:r>
-            <a:r>
-              <a:rPr lang="en-US" sz="1200" dirty="0" smtClean="0"/>
-              <a:t>2.8.9.2 Color256DataBase.py</a:t>
+              <a:t> 2.8.9.2 Color256DataBase.py</a:t>
             </a:r>
             <a:endParaRPr lang="en-US" sz="1200" dirty="0"/>
           </a:p>
@@ -9204,11 +9192,7 @@
             </a:r>
             <a:r>
               <a:rPr lang="en-US" sz="1200" dirty="0" smtClean="0"/>
-              <a:t> </a:t>
-            </a:r>
-            <a:r>
-              <a:rPr lang="en-US" sz="1200" dirty="0" smtClean="0"/>
-              <a:t>2.8.9.2 Color88DataBase.py</a:t>
+              <a:t> 2.8.9.2 Color88DataBase.py</a:t>
             </a:r>
             <a:endParaRPr lang="en-US" sz="1200" dirty="0"/>
           </a:p>
@@ -9224,11 +9208,7 @@
             </a:r>
             <a:r>
               <a:rPr lang="en-US" sz="1200" dirty="0" smtClean="0"/>
-              <a:t> </a:t>
-            </a:r>
-            <a:r>
-              <a:rPr lang="en-US" sz="1200" dirty="0" smtClean="0"/>
-              <a:t>2.8.9.2 Color8DataBase.py</a:t>
+              <a:t> 2.8.9.2 Color8DataBase.py</a:t>
             </a:r>
             <a:endParaRPr lang="en-US" sz="1200" dirty="0"/>
           </a:p>
@@ -9244,11 +9224,7 @@
             </a:r>
             <a:r>
               <a:rPr lang="en-US" sz="1200" dirty="0" smtClean="0"/>
-              <a:t> </a:t>
-            </a:r>
-            <a:r>
-              <a:rPr lang="en-US" sz="1200" dirty="0" smtClean="0"/>
-              <a:t>2.8.9.2 Color8SubstitutionMap.py</a:t>
+              <a:t> 2.8.9.2 Color8SubstitutionMap.py</a:t>
             </a:r>
             <a:endParaRPr lang="en-US" sz="1200" dirty="0"/>
           </a:p>
@@ -9264,11 +9240,7 @@
             </a:r>
             <a:r>
               <a:rPr lang="en-US" sz="1200" dirty="0" smtClean="0"/>
-              <a:t> </a:t>
-            </a:r>
-            <a:r>
-              <a:rPr lang="en-US" sz="1200" dirty="0" smtClean="0"/>
-              <a:t>2.8.9.2 ColorDataBaseRGB.py</a:t>
+              <a:t> 2.8.9.2 ColorDataBaseRGB.py</a:t>
             </a:r>
             <a:endParaRPr lang="en-US" sz="1200" dirty="0"/>
           </a:p>
@@ -9284,11 +9256,7 @@
             </a:r>
             <a:r>
               <a:rPr lang="en-US" sz="1200" dirty="0" smtClean="0"/>
-              <a:t> </a:t>
-            </a:r>
-            <a:r>
-              <a:rPr lang="en-US" sz="1200" dirty="0" smtClean="0"/>
-              <a:t>2.8.9.2 ColorNames.py</a:t>
+              <a:t> 2.8.9.2 ColorNames.py</a:t>
             </a:r>
             <a:endParaRPr lang="en-US" sz="1200" dirty="0"/>
           </a:p>
@@ -9304,11 +9272,7 @@
             </a:r>
             <a:r>
               <a:rPr lang="en-US" sz="1200" dirty="0" smtClean="0"/>
-              <a:t> </a:t>
-            </a:r>
-            <a:r>
-              <a:rPr lang="en-US" sz="1200" dirty="0" smtClean="0"/>
-              <a:t>2.8.9.2 ColorRGBNames.py</a:t>
+              <a:t> 2.8.9.2 ColorRGBNames.py</a:t>
             </a:r>
             <a:endParaRPr lang="en-US" sz="1200" dirty="0"/>
           </a:p>
@@ -9324,11 +9288,7 @@
             </a:r>
             <a:r>
               <a:rPr lang="en-US" sz="1200" dirty="0" smtClean="0"/>
-              <a:t> </a:t>
-            </a:r>
-            <a:r>
-              <a:rPr lang="en-US" sz="1200" dirty="0" smtClean="0"/>
-              <a:t>2.8.9.2 ColorRGBValues.py</a:t>
+              <a:t> 2.8.9.2 ColorRGBValues.py</a:t>
             </a:r>
             <a:endParaRPr lang="en-US" sz="1200" dirty="0"/>
           </a:p>
@@ -9344,11 +9304,7 @@
             </a:r>
             <a:r>
               <a:rPr lang="en-US" sz="1200" dirty="0" smtClean="0"/>
-              <a:t> </a:t>
-            </a:r>
-            <a:r>
-              <a:rPr lang="en-US" sz="1200" dirty="0" smtClean="0"/>
-              <a:t>2.8.9.2 MonochromeDataBase.py</a:t>
+              <a:t> 2.8.9.2 MonochromeDataBase.py</a:t>
             </a:r>
             <a:endParaRPr lang="en-US" sz="1200" dirty="0"/>
           </a:p>
@@ -9373,7 +9329,7 @@
           <a:p>
             <a:fld id="{82CC87A2-1781-440A-9FCF-DC78272C75A5}" type="datetime1">
               <a:rPr lang="en-US" smtClean="0"/>
-              <a:t>11/29/2015</a:t>
+              <a:t>12/2/2015</a:t>
             </a:fld>
             <a:endParaRPr lang="en-US" smtClean="0"/>
           </a:p>
@@ -9845,7 +9801,7 @@
           <a:p>
             <a:fld id="{82CC87A2-1781-440A-9FCF-DC78272C75A5}" type="datetime1">
               <a:rPr lang="en-US" smtClean="0"/>
-              <a:t>11/29/2015</a:t>
+              <a:t>12/2/2015</a:t>
             </a:fld>
             <a:endParaRPr lang="en-US" smtClean="0"/>
           </a:p>
@@ -10168,7 +10124,7 @@
           <a:p>
             <a:fld id="{82CC87A2-1781-440A-9FCF-DC78272C75A5}" type="datetime1">
               <a:rPr lang="en-US" smtClean="0"/>
-              <a:t>11/29/2015</a:t>
+              <a:t>12/2/2015</a:t>
             </a:fld>
             <a:endParaRPr lang="en-US" smtClean="0"/>
           </a:p>
@@ -10675,7 +10631,7 @@
           <a:p>
             <a:fld id="{82CC87A2-1781-440A-9FCF-DC78272C75A5}" type="datetime1">
               <a:rPr lang="en-US" smtClean="0"/>
-              <a:t>11/29/2015</a:t>
+              <a:t>12/2/2015</a:t>
             </a:fld>
             <a:endParaRPr lang="en-US" dirty="0" smtClean="0"/>
           </a:p>
@@ -11075,7 +11031,7 @@
           <a:p>
             <a:fld id="{82CC87A2-1781-440A-9FCF-DC78272C75A5}" type="datetime1">
               <a:rPr lang="en-US" smtClean="0"/>
-              <a:t>11/29/2015</a:t>
+              <a:t>12/2/2015</a:t>
             </a:fld>
             <a:endParaRPr lang="en-US" smtClean="0"/>
           </a:p>
@@ -11421,7 +11377,7 @@
           <a:p>
             <a:fld id="{82CC87A2-1781-440A-9FCF-DC78272C75A5}" type="datetime1">
               <a:rPr lang="en-US" smtClean="0"/>
-              <a:t>11/29/2015</a:t>
+              <a:t>12/2/2015</a:t>
             </a:fld>
             <a:endParaRPr lang="en-US" smtClean="0"/>
           </a:p>
@@ -11881,7 +11837,7 @@
           <a:p>
             <a:fld id="{594743C1-DE31-4E12-9F9F-1BA9DE6E7B96}" type="datetime1">
               <a:rPr lang="en-US" smtClean="0"/>
-              <a:t>11/29/2015</a:t>
+              <a:t>12/2/2015</a:t>
             </a:fld>
             <a:endParaRPr lang="en-US" dirty="0" smtClean="0"/>
           </a:p>
@@ -12500,7 +12456,7 @@
           <a:p>
             <a:fld id="{82CC87A2-1781-440A-9FCF-DC78272C75A5}" type="datetime1">
               <a:rPr lang="en-US" smtClean="0"/>
-              <a:t>11/29/2015</a:t>
+              <a:t>12/2/2015</a:t>
             </a:fld>
             <a:endParaRPr lang="en-US" smtClean="0"/>
           </a:p>
@@ -12939,7 +12895,7 @@
           <a:p>
             <a:fld id="{82CC87A2-1781-440A-9FCF-DC78272C75A5}" type="datetime1">
               <a:rPr lang="en-US" smtClean="0"/>
-              <a:t>11/29/2015</a:t>
+              <a:t>12/2/2015</a:t>
             </a:fld>
             <a:endParaRPr lang="en-US" smtClean="0"/>
           </a:p>
@@ -13537,7 +13493,7 @@
           <a:p>
             <a:fld id="{82CC87A2-1781-440A-9FCF-DC78272C75A5}" type="datetime1">
               <a:rPr lang="en-US" smtClean="0"/>
-              <a:t>11/29/2015</a:t>
+              <a:t>12/2/2015</a:t>
             </a:fld>
             <a:endParaRPr lang="en-US" smtClean="0"/>
           </a:p>
@@ -13759,11 +13715,7 @@
             </a:r>
             <a:r>
               <a:rPr lang="en-US" sz="2000" dirty="0" smtClean="0"/>
-              <a:t> </a:t>
-            </a:r>
-            <a:r>
-              <a:rPr lang="en-US" sz="2000" dirty="0" smtClean="0"/>
-              <a:t>2.8.9.2 Color16DataBase.py</a:t>
+              <a:t> 2.8.9.2 Color16DataBase.py</a:t>
             </a:r>
             <a:endParaRPr lang="en-US" sz="2000" dirty="0"/>
           </a:p>
@@ -13779,11 +13731,7 @@
             </a:r>
             <a:r>
               <a:rPr lang="en-US" sz="2000" dirty="0" smtClean="0"/>
-              <a:t> </a:t>
-            </a:r>
-            <a:r>
-              <a:rPr lang="en-US" sz="2000" dirty="0" smtClean="0"/>
-              <a:t>2.8.9.2 Color16SubstitutionMap.py</a:t>
+              <a:t> 2.8.9.2 Color16SubstitutionMap.py</a:t>
             </a:r>
             <a:endParaRPr lang="en-US" sz="2000" dirty="0"/>
           </a:p>
@@ -13799,11 +13747,7 @@
             </a:r>
             <a:r>
               <a:rPr lang="en-US" sz="2000" dirty="0" smtClean="0"/>
-              <a:t> </a:t>
-            </a:r>
-            <a:r>
-              <a:rPr lang="en-US" sz="2000" dirty="0" smtClean="0"/>
-              <a:t>2.8.9.2 Color256DataBase.py</a:t>
+              <a:t> 2.8.9.2 Color256DataBase.py</a:t>
             </a:r>
             <a:endParaRPr lang="en-US" sz="2000" dirty="0"/>
           </a:p>
@@ -13819,11 +13763,7 @@
             </a:r>
             <a:r>
               <a:rPr lang="en-US" sz="2000" dirty="0" smtClean="0"/>
-              <a:t> </a:t>
-            </a:r>
-            <a:r>
-              <a:rPr lang="en-US" sz="2000" dirty="0" smtClean="0"/>
-              <a:t>2.8.9.2 Color88DataBase.py</a:t>
+              <a:t> 2.8.9.2 Color88DataBase.py</a:t>
             </a:r>
             <a:endParaRPr lang="en-US" sz="2000" dirty="0"/>
           </a:p>
@@ -13839,11 +13779,7 @@
             </a:r>
             <a:r>
               <a:rPr lang="en-US" sz="2000" dirty="0" smtClean="0"/>
-              <a:t> </a:t>
-            </a:r>
-            <a:r>
-              <a:rPr lang="en-US" sz="2000" dirty="0" smtClean="0"/>
-              <a:t>2.8.9.2 Color8DataBase.py</a:t>
+              <a:t> 2.8.9.2 Color8DataBase.py</a:t>
             </a:r>
             <a:endParaRPr lang="en-US" sz="2000" dirty="0"/>
           </a:p>
@@ -13859,11 +13795,7 @@
             </a:r>
             <a:r>
               <a:rPr lang="en-US" sz="2000" dirty="0" smtClean="0"/>
-              <a:t> </a:t>
-            </a:r>
-            <a:r>
-              <a:rPr lang="en-US" sz="2000" dirty="0" smtClean="0"/>
-              <a:t>2.8.9.2 Color8SubstitutionMap.py</a:t>
+              <a:t> 2.8.9.2 Color8SubstitutionMap.py</a:t>
             </a:r>
             <a:endParaRPr lang="en-US" sz="2000" dirty="0"/>
           </a:p>
@@ -13879,11 +13811,7 @@
             </a:r>
             <a:r>
               <a:rPr lang="en-US" sz="2000" dirty="0" smtClean="0"/>
-              <a:t> </a:t>
-            </a:r>
-            <a:r>
-              <a:rPr lang="en-US" sz="2000" dirty="0" smtClean="0"/>
-              <a:t>2.8.9.2 ColorDataBaseRGB.py</a:t>
+              <a:t> 2.8.9.2 ColorDataBaseRGB.py</a:t>
             </a:r>
             <a:endParaRPr lang="en-US" sz="2000" dirty="0"/>
           </a:p>
@@ -13899,11 +13827,7 @@
             </a:r>
             <a:r>
               <a:rPr lang="en-US" sz="2000" dirty="0" smtClean="0"/>
-              <a:t> </a:t>
-            </a:r>
-            <a:r>
-              <a:rPr lang="en-US" sz="2000" dirty="0" smtClean="0"/>
-              <a:t>2.8.9.2 ColorNames.py</a:t>
+              <a:t> 2.8.9.2 ColorNames.py</a:t>
             </a:r>
             <a:endParaRPr lang="en-US" sz="2000" dirty="0"/>
           </a:p>
@@ -13919,11 +13843,7 @@
             </a:r>
             <a:r>
               <a:rPr lang="en-US" sz="2000" dirty="0" smtClean="0"/>
-              <a:t> </a:t>
-            </a:r>
-            <a:r>
-              <a:rPr lang="en-US" sz="2000" dirty="0" smtClean="0"/>
-              <a:t>2.8.9.2 ColorRGBNames.py</a:t>
+              <a:t> 2.8.9.2 ColorRGBNames.py</a:t>
             </a:r>
             <a:endParaRPr lang="en-US" sz="2000" dirty="0"/>
           </a:p>
@@ -13939,11 +13859,7 @@
             </a:r>
             <a:r>
               <a:rPr lang="en-US" sz="2000" dirty="0" smtClean="0"/>
-              <a:t> </a:t>
-            </a:r>
-            <a:r>
-              <a:rPr lang="en-US" sz="2000" dirty="0" smtClean="0"/>
-              <a:t>2.8.9.2 ColorRGBValues.py</a:t>
+              <a:t> 2.8.9.2 ColorRGBValues.py</a:t>
             </a:r>
             <a:endParaRPr lang="en-US" sz="2000" dirty="0"/>
           </a:p>
@@ -13959,11 +13875,7 @@
             </a:r>
             <a:r>
               <a:rPr lang="en-US" sz="2000" smtClean="0"/>
-              <a:t> </a:t>
-            </a:r>
-            <a:r>
-              <a:rPr lang="en-US" sz="2000" smtClean="0"/>
-              <a:t>2.8.9.2 MonochromeDataBase.py</a:t>
+              <a:t> 2.8.9.2 MonochromeDataBase.py</a:t>
             </a:r>
             <a:endParaRPr lang="en-US" sz="2000" dirty="0"/>
           </a:p>
@@ -13988,7 +13900,7 @@
           <a:p>
             <a:fld id="{82CC87A2-1781-440A-9FCF-DC78272C75A5}" type="datetime1">
               <a:rPr lang="en-US" smtClean="0"/>
-              <a:t>11/29/2015</a:t>
+              <a:t>12/2/2015</a:t>
             </a:fld>
             <a:endParaRPr lang="en-US" smtClean="0"/>
           </a:p>
@@ -14332,7 +14244,7 @@
             </a:pPr>
             <a:fld id="{65B11A62-63AA-4067-ACEB-AA6A42CE3A38}" type="datetime1">
               <a:rPr lang="en-US" smtClean="0"/>
-              <a:t>11/29/2015</a:t>
+              <a:t>12/2/2015</a:t>
             </a:fld>
             <a:endParaRPr lang="en-US"/>
           </a:p>
@@ -14751,7 +14663,7 @@
             </a:pPr>
             <a:fld id="{65B11A62-63AA-4067-ACEB-AA6A42CE3A38}" type="datetime1">
               <a:rPr lang="en-US" smtClean="0"/>
-              <a:t>11/29/2015</a:t>
+              <a:t>12/2/2015</a:t>
             </a:fld>
             <a:endParaRPr lang="en-US" dirty="0"/>
           </a:p>
@@ -15205,7 +15117,7 @@
           <a:p>
             <a:fld id="{C4CD0F24-D883-406C-B918-66E9EB5E340B}" type="datetime1">
               <a:rPr lang="en-US" smtClean="0"/>
-              <a:t>11/29/2015</a:t>
+              <a:t>12/2/2015</a:t>
             </a:fld>
             <a:endParaRPr lang="en-US" smtClean="0"/>
           </a:p>
@@ -15737,7 +15649,7 @@
           <a:p>
             <a:fld id="{C3FB1654-67BB-4BFC-9431-2E9085587B48}" type="datetime1">
               <a:rPr lang="en-US" smtClean="0"/>
-              <a:t>11/29/2015</a:t>
+              <a:t>12/2/2015</a:t>
             </a:fld>
             <a:endParaRPr lang="en-US" smtClean="0"/>
           </a:p>
@@ -16492,7 +16404,7 @@
           <a:p>
             <a:fld id="{82CC87A2-1781-440A-9FCF-DC78272C75A5}" type="datetime1">
               <a:rPr lang="en-US" smtClean="0"/>
-              <a:t>11/29/2015</a:t>
+              <a:t>12/2/2015</a:t>
             </a:fld>
             <a:endParaRPr lang="en-US" smtClean="0"/>
           </a:p>
@@ -16668,152 +16580,152 @@
           <a:p>
             <a:pPr eaLnBrk="1" hangingPunct="1"/>
             <a:r>
-              <a:rPr lang="en-US" sz="1400" b="1" dirty="0" smtClean="0"/>
+              <a:rPr lang="en-US" sz="1200" b="1" dirty="0" smtClean="0"/>
               <a:t>Output to the user via a terminal display device</a:t>
             </a:r>
             <a:r>
-              <a:rPr lang="en-US" sz="1400" dirty="0" smtClean="0"/>
+              <a:rPr lang="en-US" sz="1200" dirty="0" smtClean="0"/>
               <a:t>:</a:t>
             </a:r>
           </a:p>
           <a:p>
             <a:pPr lvl="1" eaLnBrk="1" hangingPunct="1"/>
             <a:r>
-              <a:rPr lang="en-US" sz="1100" b="1" dirty="0" smtClean="0"/>
+              <a:rPr lang="en-US" sz="1050" b="1" dirty="0" smtClean="0"/>
               <a:t>Pixel-mode Icons </a:t>
             </a:r>
             <a:r>
-              <a:rPr lang="en-US" sz="1100" b="1" dirty="0"/>
+              <a:rPr lang="en-US" sz="1050" b="1" dirty="0"/>
               <a:t>are pictograms </a:t>
             </a:r>
             <a:r>
-              <a:rPr lang="en-US" sz="1100" dirty="0"/>
+              <a:rPr lang="en-US" sz="1050" dirty="0"/>
               <a:t>(more like a traffic sign than a detailed illustration of the actual entity it represents) which help the user monitor and control computer operation. Icons can optionally serve as an electronic hyperlink or file shortcut to trigger a program or access data</a:t>
             </a:r>
           </a:p>
           <a:p>
             <a:pPr lvl="1" eaLnBrk="1" hangingPunct="1"/>
             <a:r>
-              <a:rPr lang="en-US" sz="1100" b="1" dirty="0" smtClean="0"/>
+              <a:rPr lang="en-US" sz="1050" b="1" dirty="0" smtClean="0"/>
               <a:t>Character-mode “wxPython 2.8.9.2” </a:t>
             </a:r>
             <a:r>
-              <a:rPr lang="en-US" sz="1100" b="1" dirty="0"/>
+              <a:rPr lang="en-US" sz="1050" b="1" dirty="0"/>
               <a:t>API </a:t>
             </a:r>
             <a:r>
-              <a:rPr lang="en-US" sz="1100" b="1" dirty="0" smtClean="0"/>
+              <a:rPr lang="en-US" sz="1050" b="1" dirty="0" smtClean="0"/>
               <a:t>Emulation </a:t>
             </a:r>
             <a:r>
-              <a:rPr lang="en-US" sz="1100" dirty="0" smtClean="0"/>
+              <a:rPr lang="en-US" sz="1050" dirty="0" smtClean="0"/>
               <a:t>uses its host platform’s native Curses services to input from terminal pointing &amp; keyboard devices and to output icon characters </a:t>
             </a:r>
             <a:r>
-              <a:rPr lang="en-US" sz="1100" dirty="0"/>
+              <a:rPr lang="en-US" sz="1050" dirty="0"/>
               <a:t>and </a:t>
             </a:r>
             <a:r>
-              <a:rPr lang="en-US" sz="1100" dirty="0" smtClean="0"/>
+              <a:rPr lang="en-US" sz="1050" dirty="0" smtClean="0"/>
               <a:t>text composed of pre-defined fixed-size character cells (hardware generated array of pixels) to </a:t>
             </a:r>
             <a:r>
-              <a:rPr lang="en-US" sz="1100" dirty="0"/>
+              <a:rPr lang="en-US" sz="1050" dirty="0"/>
               <a:t>application-specified </a:t>
             </a:r>
             <a:r>
-              <a:rPr lang="en-US" sz="1100" dirty="0" smtClean="0"/>
+              <a:rPr lang="en-US" sz="1050" dirty="0" smtClean="0"/>
               <a:t>character </a:t>
             </a:r>
             <a:r>
-              <a:rPr lang="en-US" sz="1100" dirty="0"/>
+              <a:rPr lang="en-US" sz="1050" dirty="0"/>
               <a:t>c</a:t>
             </a:r>
             <a:r>
-              <a:rPr lang="en-US" sz="1100" dirty="0" smtClean="0"/>
+              <a:rPr lang="en-US" sz="1050" dirty="0" smtClean="0"/>
               <a:t>ell column </a:t>
             </a:r>
             <a:r>
-              <a:rPr lang="en-US" sz="1100" dirty="0"/>
+              <a:rPr lang="en-US" sz="1050" dirty="0"/>
               <a:t>and row (line) fields on a computer terminal display</a:t>
             </a:r>
             <a:r>
-              <a:rPr lang="en-US" sz="1100" dirty="0" smtClean="0"/>
+              <a:rPr lang="en-US" sz="1050" dirty="0" smtClean="0"/>
               <a:t>.</a:t>
             </a:r>
           </a:p>
           <a:p>
             <a:pPr eaLnBrk="1" hangingPunct="1"/>
             <a:r>
-              <a:rPr lang="en-US" sz="1400" b="1" dirty="0" smtClean="0"/>
+              <a:rPr lang="en-US" sz="1200" b="1" dirty="0" smtClean="0"/>
               <a:t>Input </a:t>
             </a:r>
             <a:r>
-              <a:rPr lang="en-US" sz="1400" b="1" dirty="0"/>
+              <a:rPr lang="en-US" sz="1200" b="1" dirty="0"/>
               <a:t>from the user via a </a:t>
             </a:r>
             <a:r>
-              <a:rPr lang="en-US" sz="1400" b="1" dirty="0" smtClean="0"/>
+              <a:rPr lang="en-US" sz="1200" b="1" dirty="0" smtClean="0"/>
               <a:t>terminal </a:t>
             </a:r>
             <a:r>
-              <a:rPr lang="en-US" sz="1400" b="1" dirty="0"/>
+              <a:rPr lang="en-US" sz="1200" b="1" dirty="0"/>
               <a:t>device:</a:t>
             </a:r>
           </a:p>
           <a:p>
             <a:pPr lvl="1" eaLnBrk="1" hangingPunct="1"/>
             <a:r>
-              <a:rPr lang="en-US" sz="1100" b="1" dirty="0"/>
+              <a:rPr lang="en-US" sz="1050" b="1" dirty="0"/>
               <a:t>Pointing Device (mouse, trackball, </a:t>
             </a:r>
             <a:r>
-              <a:rPr lang="en-US" sz="1100" b="1" dirty="0" smtClean="0"/>
+              <a:rPr lang="en-US" sz="1050" b="1" dirty="0" smtClean="0"/>
               <a:t>touch pad </a:t>
             </a:r>
             <a:r>
-              <a:rPr lang="en-US" sz="1100" b="1" dirty="0"/>
+              <a:rPr lang="en-US" sz="1050" b="1" dirty="0"/>
               <a:t>or </a:t>
             </a:r>
             <a:r>
-              <a:rPr lang="en-US" sz="1100" b="1" dirty="0" smtClean="0"/>
+              <a:rPr lang="en-US" sz="1050" b="1" dirty="0" smtClean="0"/>
               <a:t>screen</a:t>
             </a:r>
             <a:r>
-              <a:rPr lang="en-US" sz="1100" b="1" dirty="0"/>
+              <a:rPr lang="en-US" sz="1050" b="1" dirty="0"/>
               <a:t>)</a:t>
             </a:r>
           </a:p>
           <a:p>
             <a:pPr lvl="2" eaLnBrk="1" hangingPunct="1"/>
             <a:r>
-              <a:rPr lang="en-US" sz="1100" dirty="0"/>
+              <a:rPr lang="en-US" sz="1050" dirty="0"/>
               <a:t>Device is moved into a position by its operator before a mouse button is clicked to trigger a function button, radio button, checkbox or keyboard input operation.</a:t>
             </a:r>
           </a:p>
           <a:p>
             <a:pPr lvl="1" eaLnBrk="1" hangingPunct="1"/>
             <a:r>
-              <a:rPr lang="en-US" sz="1100" b="1" dirty="0"/>
+              <a:rPr lang="en-US" sz="1050" b="1" dirty="0"/>
               <a:t>Keyboard Device:</a:t>
             </a:r>
           </a:p>
           <a:p>
             <a:pPr lvl="2" eaLnBrk="1" hangingPunct="1"/>
             <a:r>
-              <a:rPr lang="en-US" sz="1100" dirty="0"/>
+              <a:rPr lang="en-US" sz="1050" dirty="0"/>
               <a:t>Input</a:t>
             </a:r>
             <a:r>
-              <a:rPr lang="en-US" sz="1100" b="1" dirty="0"/>
+              <a:rPr lang="en-US" sz="1050" b="1" dirty="0"/>
               <a:t> </a:t>
             </a:r>
             <a:r>
-              <a:rPr lang="en-US" sz="1100" dirty="0"/>
+              <a:rPr lang="en-US" sz="1050" dirty="0"/>
               <a:t>may be echoed as output to a reserved area of the display that is written from top to bottom and then scrolling off the top as each new line is written to the bottom of the reserved </a:t>
             </a:r>
             <a:r>
-              <a:rPr lang="en-US" sz="1100" dirty="0" smtClean="0"/>
+              <a:rPr lang="en-US" sz="1050" dirty="0" smtClean="0"/>
               <a:t>area</a:t>
             </a:r>
           </a:p>
@@ -16847,189 +16759,222 @@
           <a:p>
             <a:pPr eaLnBrk="1" hangingPunct="1"/>
             <a:r>
-              <a:rPr lang="en-US" sz="1400" b="1" dirty="0" smtClean="0"/>
+              <a:rPr lang="en-US" sz="1200" b="1" dirty="0" smtClean="0"/>
               <a:t>Comparison of Pixel-mode with Character-mode Emulation</a:t>
             </a:r>
           </a:p>
           <a:p>
             <a:pPr lvl="1" eaLnBrk="1" hangingPunct="1"/>
             <a:r>
-              <a:rPr lang="en-US" sz="1100" b="1" dirty="0"/>
+              <a:rPr lang="en-US" sz="1050" b="1" dirty="0"/>
               <a:t>P</a:t>
             </a:r>
             <a:r>
-              <a:rPr lang="en-US" sz="1100" b="1" dirty="0" smtClean="0"/>
+              <a:rPr lang="en-US" sz="1050" b="1" dirty="0" smtClean="0"/>
               <a:t>ixel-mode “wxPython 2.8.9.2” API u</a:t>
             </a:r>
             <a:r>
-              <a:rPr lang="en-US" sz="1100" dirty="0" smtClean="0"/>
+              <a:rPr lang="en-US" sz="1050" dirty="0" smtClean="0"/>
               <a:t>ses</a:t>
             </a:r>
             <a:r>
-              <a:rPr lang="en-US" sz="1100" b="1" dirty="0" smtClean="0"/>
+              <a:rPr lang="en-US" sz="1050" b="1" dirty="0" smtClean="0"/>
               <a:t> </a:t>
             </a:r>
             <a:r>
-              <a:rPr lang="en-US" sz="1100" dirty="0"/>
+              <a:rPr lang="en-US" sz="1050" dirty="0"/>
               <a:t>its host platform’s native GUI  services to input from terminal pointing &amp; keyboard devices and to output icons and text strings composed of dot-based picture elements (pixels) to application-specified pixel cell column and row (line) fields on a computer terminal display.</a:t>
             </a:r>
           </a:p>
           <a:p>
             <a:pPr lvl="1" eaLnBrk="1" hangingPunct="1"/>
             <a:r>
-              <a:rPr lang="en-US" sz="1100" b="1" dirty="0"/>
+              <a:rPr lang="en-US" sz="1050" b="1" dirty="0"/>
               <a:t>Character-mode </a:t>
             </a:r>
             <a:r>
-              <a:rPr lang="en-US" sz="1100" b="1" dirty="0" smtClean="0"/>
+              <a:rPr lang="en-US" sz="1050" b="1" dirty="0" smtClean="0"/>
               <a:t>“wxPython 2.8.9.2” </a:t>
             </a:r>
             <a:r>
-              <a:rPr lang="en-US" sz="1100" b="1" dirty="0"/>
+              <a:rPr lang="en-US" sz="1050" b="1" dirty="0"/>
               <a:t>API Emulation </a:t>
             </a:r>
             <a:r>
-              <a:rPr lang="en-US" sz="1100" b="1" dirty="0" smtClean="0"/>
+              <a:rPr lang="en-US" sz="1050" b="1" dirty="0" smtClean="0"/>
               <a:t>c</a:t>
             </a:r>
             <a:r>
-              <a:rPr lang="en-US" sz="1100" dirty="0" smtClean="0"/>
+              <a:rPr lang="en-US" sz="1050" dirty="0" smtClean="0"/>
               <a:t>onsumes </a:t>
             </a:r>
             <a:r>
-              <a:rPr lang="en-US" sz="1100" dirty="0"/>
+              <a:rPr lang="en-US" sz="1050" dirty="0"/>
               <a:t>significantly less memory, processor time and communication bandwidth than Pixel-mode</a:t>
             </a:r>
             <a:r>
-              <a:rPr lang="en-US" sz="1100" dirty="0" smtClean="0"/>
+              <a:rPr lang="en-US" sz="1050" dirty="0" smtClean="0"/>
               <a:t>. For a simplified example:</a:t>
             </a:r>
           </a:p>
           <a:p>
             <a:pPr lvl="2" eaLnBrk="1" hangingPunct="1"/>
             <a:r>
-              <a:rPr lang="en-US" sz="1100" dirty="0" smtClean="0"/>
+              <a:rPr lang="en-US" sz="1050" dirty="0" smtClean="0"/>
               <a:t>In Character-mode, one 8-bit-byte character </a:t>
             </a:r>
             <a:r>
-              <a:rPr lang="en-US" sz="1100" dirty="0"/>
+              <a:rPr lang="en-US" sz="1050" dirty="0"/>
               <a:t>code can designate one of 256 </a:t>
             </a:r>
             <a:r>
-              <a:rPr lang="en-US" sz="1100" dirty="0" smtClean="0"/>
+              <a:rPr lang="en-US" sz="1050" dirty="0" smtClean="0"/>
               <a:t>alphanumeric</a:t>
             </a:r>
             <a:r>
-              <a:rPr lang="en-US" sz="1100" dirty="0"/>
+              <a:rPr lang="en-US" sz="1050" dirty="0"/>
               <a:t>, punctuation or line –drawing characters (in an 8x12 pixel font) </a:t>
             </a:r>
             <a:r>
-              <a:rPr lang="en-US" sz="1100" dirty="0" smtClean="0"/>
+              <a:rPr lang="en-US" sz="1050" dirty="0" smtClean="0"/>
               <a:t>plus a </a:t>
             </a:r>
             <a:r>
-              <a:rPr lang="en-US" sz="1100" dirty="0"/>
+              <a:rPr lang="en-US" sz="1050" dirty="0"/>
               <a:t>second </a:t>
             </a:r>
             <a:r>
-              <a:rPr lang="en-US" sz="1100" dirty="0" smtClean="0"/>
+              <a:rPr lang="en-US" sz="1050" dirty="0" smtClean="0"/>
               <a:t>8-bit-byte character </a:t>
             </a:r>
             <a:r>
-              <a:rPr lang="en-US" sz="1100" dirty="0"/>
+              <a:rPr lang="en-US" sz="1050" dirty="0"/>
               <a:t>can represent the foreground-background color pair in a 16-color </a:t>
             </a:r>
             <a:r>
-              <a:rPr lang="en-US" sz="1100" dirty="0" smtClean="0"/>
+              <a:rPr lang="en-US" sz="1050" dirty="0" smtClean="0"/>
               <a:t>palette. As a consequence, computer-terminal communication bandwidth </a:t>
             </a:r>
             <a:r>
-              <a:rPr lang="en-US" sz="1100" dirty="0"/>
+              <a:rPr lang="en-US" sz="1050" dirty="0"/>
               <a:t>consumes 2 Character-mode </a:t>
             </a:r>
             <a:r>
-              <a:rPr lang="en-US" sz="1100" dirty="0" smtClean="0"/>
+              <a:rPr lang="en-US" sz="1050" dirty="0" smtClean="0"/>
               <a:t>bytes per </a:t>
             </a:r>
             <a:r>
-              <a:rPr lang="en-US" sz="1100" dirty="0"/>
+              <a:rPr lang="en-US" sz="1050" dirty="0"/>
               <a:t>8x12 pixel font </a:t>
             </a:r>
             <a:r>
-              <a:rPr lang="en-US" sz="1100" dirty="0" smtClean="0"/>
-              <a:t>character cell.</a:t>
-            </a:r>
+              <a:rPr lang="en-US" sz="1050" dirty="0" smtClean="0"/>
+              <a:t>character cell</a:t>
+            </a:r>
+            <a:r>
+              <a:rPr lang="en-US" sz="1050" dirty="0" smtClean="0"/>
+              <a:t>. </a:t>
+            </a:r>
+            <a:r>
+              <a:rPr lang="en-US" sz="1050" b="1" i="1" dirty="0" smtClean="0"/>
+              <a:t>A display update will NOT occur until a “</a:t>
+            </a:r>
+            <a:r>
+              <a:rPr lang="en-US" sz="1050" b="1" i="1" dirty="0" err="1" smtClean="0"/>
+              <a:t>wxPython</a:t>
+            </a:r>
+            <a:r>
+              <a:rPr lang="en-US" sz="1050" b="1" i="1" dirty="0" smtClean="0"/>
+              <a:t>”  application or event handler invokes </a:t>
+            </a:r>
+            <a:r>
+              <a:rPr lang="en-US" sz="1050" b="1" i="1" smtClean="0"/>
+              <a:t>the  emulation’s “Show</a:t>
+            </a:r>
+            <a:r>
+              <a:rPr lang="en-US" sz="1050" b="1" i="1" dirty="0" smtClean="0"/>
+              <a:t>’ method, which in turn invokes the “curses” “</a:t>
+            </a:r>
+            <a:r>
+              <a:rPr lang="en-US" sz="1050" b="1" i="1" dirty="0" err="1" smtClean="0"/>
+              <a:t>window.refresh</a:t>
+            </a:r>
+            <a:r>
+              <a:rPr lang="en-US" sz="1050" b="1" i="1" dirty="0" smtClean="0"/>
+              <a:t>” method.</a:t>
+            </a:r>
+            <a:endParaRPr lang="en-US" sz="1050" b="1" i="1" dirty="0" smtClean="0"/>
           </a:p>
           <a:p>
             <a:pPr lvl="2" eaLnBrk="1" hangingPunct="1"/>
             <a:r>
-              <a:rPr lang="en-US" sz="1100" dirty="0" smtClean="0"/>
+              <a:rPr lang="en-US" sz="1050" dirty="0" smtClean="0"/>
               <a:t>In Pixel-mode, one 8-bit-byte code sets the intensity of three individual Red-Green-Blue color subpixels (for a 16-million color palette) associated with each pixel in an 8x12 font cell</a:t>
             </a:r>
             <a:r>
-              <a:rPr lang="en-US" sz="1100" dirty="0"/>
+              <a:rPr lang="en-US" sz="1050" dirty="0"/>
               <a:t>. As a consequence, computer-terminal communication bandwidth consumes </a:t>
             </a:r>
             <a:r>
-              <a:rPr lang="en-US" sz="1100" dirty="0" smtClean="0"/>
+              <a:rPr lang="en-US" sz="1050" dirty="0" smtClean="0"/>
               <a:t>288 Pixel-mode bytes </a:t>
             </a:r>
             <a:r>
-              <a:rPr lang="en-US" sz="1100" dirty="0"/>
+              <a:rPr lang="en-US" sz="1050" dirty="0"/>
               <a:t>per 8x12 pixel font </a:t>
             </a:r>
             <a:r>
-              <a:rPr lang="en-US" sz="1100" dirty="0" smtClean="0"/>
+              <a:rPr lang="en-US" sz="1050" dirty="0" smtClean="0"/>
               <a:t>character </a:t>
             </a:r>
             <a:r>
-              <a:rPr lang="en-US" sz="1100" dirty="0"/>
+              <a:rPr lang="en-US" sz="1050" dirty="0"/>
               <a:t>cell</a:t>
             </a:r>
             <a:r>
-              <a:rPr lang="en-US" sz="1100" dirty="0" smtClean="0"/>
+              <a:rPr lang="en-US" sz="1050" dirty="0" smtClean="0"/>
               <a:t>.</a:t>
             </a:r>
           </a:p>
           <a:p>
             <a:pPr lvl="2" eaLnBrk="1" hangingPunct="1"/>
             <a:r>
-              <a:rPr lang="en-US" sz="1100" dirty="0"/>
+              <a:rPr lang="en-US" sz="1050" dirty="0"/>
               <a:t>Retains names of original </a:t>
             </a:r>
             <a:r>
-              <a:rPr lang="en-US" sz="1100" dirty="0" smtClean="0"/>
+              <a:rPr lang="en-US" sz="1050" dirty="0" smtClean="0"/>
               <a:t>“wxPython 2.8.9.2” </a:t>
             </a:r>
             <a:r>
-              <a:rPr lang="en-US" sz="1100" dirty="0"/>
+              <a:rPr lang="en-US" sz="1050" dirty="0"/>
               <a:t>classes, methods, functions, constants and variables.</a:t>
             </a:r>
           </a:p>
           <a:p>
             <a:pPr lvl="2" eaLnBrk="1" hangingPunct="1"/>
             <a:r>
-              <a:rPr lang="en-US" sz="1100" dirty="0"/>
+              <a:rPr lang="en-US" sz="1050" dirty="0"/>
               <a:t>Uses “</a:t>
             </a:r>
             <a:r>
-              <a:rPr lang="en-US" sz="1100" dirty="0" err="1"/>
+              <a:rPr lang="en-US" sz="1050" dirty="0" err="1"/>
               <a:t>tsWx</a:t>
             </a:r>
             <a:r>
-              <a:rPr lang="en-US" sz="1100" dirty="0"/>
+              <a:rPr lang="en-US" sz="1050" dirty="0"/>
               <a:t>” prefix to file names and “</a:t>
             </a:r>
             <a:r>
-              <a:rPr lang="en-US" sz="1100" dirty="0" err="1"/>
+              <a:rPr lang="en-US" sz="1050" dirty="0" err="1"/>
               <a:t>ts</a:t>
             </a:r>
             <a:r>
-              <a:rPr lang="en-US" sz="1100" dirty="0"/>
+              <a:rPr lang="en-US" sz="1050" dirty="0"/>
               <a:t>” prefix to names of internal classes, methods, functions, constants and variables</a:t>
             </a:r>
             <a:r>
-              <a:rPr lang="en-US" sz="1100" dirty="0" smtClean="0"/>
+              <a:rPr lang="en-US" sz="1050" dirty="0" smtClean="0"/>
               <a:t>.</a:t>
             </a:r>
           </a:p>
@@ -17054,7 +16999,7 @@
           <a:p>
             <a:fld id="{A628D7B9-A196-43FB-98FC-214F3C36C725}" type="datetime1">
               <a:rPr lang="en-US" smtClean="0"/>
-              <a:t>11/29/2015</a:t>
+              <a:t>12/2/2015</a:t>
             </a:fld>
             <a:endParaRPr lang="en-US" dirty="0" smtClean="0"/>
           </a:p>
@@ -17750,7 +17695,7 @@
           <a:p>
             <a:fld id="{82CC87A2-1781-440A-9FCF-DC78272C75A5}" type="datetime1">
               <a:rPr lang="en-US" smtClean="0"/>
-              <a:t>11/29/2015</a:t>
+              <a:t>12/2/2015</a:t>
             </a:fld>
             <a:endParaRPr lang="en-US" dirty="0" smtClean="0"/>
           </a:p>

</xml_diff>

<commit_message>
Update Developer-Sandbox and Site-Package copies of mater Documents.
</commit_message>
<xml_diff>
--- a/Notebooks/EngineeringNotebook/MS-PowerPoint-Files/tsWxGTUI_PyVx/UseCase_5_Graphical_User_Interface.pptx
+++ b/Notebooks/EngineeringNotebook/MS-PowerPoint-Files/tsWxGTUI_PyVx/UseCase_5_Graphical_User_Interface.pptx
@@ -306,7 +306,7 @@
               <a:pPr>
                 <a:defRPr/>
               </a:pPr>
-              <a:t>12/2/2015</a:t>
+              <a:t>12/4/2015</a:t>
             </a:fld>
             <a:endParaRPr lang="en-US"/>
           </a:p>
@@ -543,7 +543,7 @@
               <a:pPr>
                 <a:defRPr/>
               </a:pPr>
-              <a:t>12/2/2015</a:t>
+              <a:t>12/4/2015</a:t>
             </a:fld>
             <a:endParaRPr lang="en-US"/>
           </a:p>
@@ -2662,7 +2662,7 @@
             </a:pPr>
             <a:fld id="{B5B52024-79AA-4062-8229-397D9E214550}" type="datetime1">
               <a:rPr lang="en-US" smtClean="0"/>
-              <a:t>12/2/2015</a:t>
+              <a:t>12/4/2015</a:t>
             </a:fld>
             <a:endParaRPr lang="en-US"/>
           </a:p>
@@ -2868,7 +2868,7 @@
             </a:pPr>
             <a:fld id="{5534B48B-48D4-4D1F-B98F-2ED8E1B04ED0}" type="datetime1">
               <a:rPr lang="en-US" smtClean="0"/>
-              <a:t>12/2/2015</a:t>
+              <a:t>12/4/2015</a:t>
             </a:fld>
             <a:endParaRPr lang="en-US"/>
           </a:p>
@@ -3070,7 +3070,7 @@
             </a:pPr>
             <a:fld id="{C3557E2B-7DD4-4DCF-9DDD-7786167218C6}" type="datetime1">
               <a:rPr lang="en-US" smtClean="0"/>
-              <a:t>12/2/2015</a:t>
+              <a:t>12/4/2015</a:t>
             </a:fld>
             <a:endParaRPr lang="en-US"/>
           </a:p>
@@ -3262,7 +3262,7 @@
             </a:pPr>
             <a:fld id="{65B11A62-63AA-4067-ACEB-AA6A42CE3A38}" type="datetime1">
               <a:rPr lang="en-US" smtClean="0"/>
-              <a:t>12/2/2015</a:t>
+              <a:t>12/4/2015</a:t>
             </a:fld>
             <a:endParaRPr lang="en-US"/>
           </a:p>
@@ -3477,7 +3477,7 @@
             </a:pPr>
             <a:fld id="{013FB6F9-CFEF-47AA-A08B-D90CED01DE9A}" type="datetime1">
               <a:rPr lang="en-US" smtClean="0"/>
-              <a:t>12/2/2015</a:t>
+              <a:t>12/4/2015</a:t>
             </a:fld>
             <a:endParaRPr lang="en-US"/>
           </a:p>
@@ -3786,7 +3786,7 @@
             </a:pPr>
             <a:fld id="{44D06F95-D493-494F-B0EB-3EDFAA385886}" type="datetime1">
               <a:rPr lang="en-US" smtClean="0"/>
-              <a:t>12/2/2015</a:t>
+              <a:t>12/4/2015</a:t>
             </a:fld>
             <a:endParaRPr lang="en-US"/>
           </a:p>
@@ -4234,7 +4234,7 @@
             </a:pPr>
             <a:fld id="{26FA81D3-96E1-4758-9306-72CE9F6E2F25}" type="datetime1">
               <a:rPr lang="en-US" smtClean="0"/>
-              <a:t>12/2/2015</a:t>
+              <a:t>12/4/2015</a:t>
             </a:fld>
             <a:endParaRPr lang="en-US"/>
           </a:p>
@@ -4375,7 +4375,7 @@
             </a:pPr>
             <a:fld id="{C22C02A3-FDB2-4B02-8110-311DDD8475C2}" type="datetime1">
               <a:rPr lang="en-US" smtClean="0"/>
-              <a:t>12/2/2015</a:t>
+              <a:t>12/4/2015</a:t>
             </a:fld>
             <a:endParaRPr lang="en-US"/>
           </a:p>
@@ -4492,7 +4492,7 @@
             </a:pPr>
             <a:fld id="{FB277746-3C8E-4161-A66B-B97D4FD5213A}" type="datetime1">
               <a:rPr lang="en-US" smtClean="0"/>
-              <a:t>12/2/2015</a:t>
+              <a:t>12/4/2015</a:t>
             </a:fld>
             <a:endParaRPr lang="en-US"/>
           </a:p>
@@ -4786,7 +4786,7 @@
             </a:pPr>
             <a:fld id="{86B778C6-FEB5-4910-BBA7-BBA76466D3B2}" type="datetime1">
               <a:rPr lang="en-US" smtClean="0"/>
-              <a:t>12/2/2015</a:t>
+              <a:t>12/4/2015</a:t>
             </a:fld>
             <a:endParaRPr lang="en-US"/>
           </a:p>
@@ -5063,7 +5063,7 @@
             </a:pPr>
             <a:fld id="{7A68BEE5-7335-4799-9F53-F65CFD274630}" type="datetime1">
               <a:rPr lang="en-US" smtClean="0"/>
-              <a:t>12/2/2015</a:t>
+              <a:t>12/4/2015</a:t>
             </a:fld>
             <a:endParaRPr lang="en-US"/>
           </a:p>
@@ -5597,7 +5597,7 @@
             </a:pPr>
             <a:fld id="{45A933D1-86C7-45FF-B83F-CA5ED825AD11}" type="datetime1">
               <a:rPr lang="en-US" smtClean="0"/>
-              <a:t>12/2/2015</a:t>
+              <a:t>12/4/2015</a:t>
             </a:fld>
             <a:endParaRPr lang="en-US"/>
           </a:p>
@@ -6237,7 +6237,7 @@
           <a:p>
             <a:fld id="{878D0E70-D567-4EAD-BEEC-D30EFDF84A73}" type="datetime1">
               <a:rPr lang="en-US" smtClean="0"/>
-              <a:t>12/2/2015</a:t>
+              <a:t>12/4/2015</a:t>
             </a:fld>
             <a:endParaRPr lang="en-US" smtClean="0"/>
           </a:p>
@@ -6497,7 +6497,7 @@
             </a:pPr>
             <a:fld id="{44D06F95-D493-494F-B0EB-3EDFAA385886}" type="datetime1">
               <a:rPr lang="en-US" smtClean="0"/>
-              <a:t>12/2/2015</a:t>
+              <a:t>12/4/2015</a:t>
             </a:fld>
             <a:endParaRPr lang="en-US"/>
           </a:p>
@@ -7305,7 +7305,7 @@
           <a:p>
             <a:fld id="{82CC87A2-1781-440A-9FCF-DC78272C75A5}" type="datetime1">
               <a:rPr lang="en-US" smtClean="0"/>
-              <a:t>12/2/2015</a:t>
+              <a:t>12/4/2015</a:t>
             </a:fld>
             <a:endParaRPr lang="en-US" dirty="0" smtClean="0"/>
           </a:p>
@@ -7941,7 +7941,7 @@
           <a:p>
             <a:fld id="{82CC87A2-1781-440A-9FCF-DC78272C75A5}" type="datetime1">
               <a:rPr lang="en-US" smtClean="0"/>
-              <a:t>12/2/2015</a:t>
+              <a:t>12/4/2015</a:t>
             </a:fld>
             <a:endParaRPr lang="en-US" dirty="0" smtClean="0"/>
           </a:p>
@@ -8599,7 +8599,7 @@
           <a:p>
             <a:fld id="{82CC87A2-1781-440A-9FCF-DC78272C75A5}" type="datetime1">
               <a:rPr lang="en-US" smtClean="0"/>
-              <a:t>12/2/2015</a:t>
+              <a:t>12/4/2015</a:t>
             </a:fld>
             <a:endParaRPr lang="en-US" dirty="0" smtClean="0"/>
           </a:p>
@@ -9329,7 +9329,7 @@
           <a:p>
             <a:fld id="{82CC87A2-1781-440A-9FCF-DC78272C75A5}" type="datetime1">
               <a:rPr lang="en-US" smtClean="0"/>
-              <a:t>12/2/2015</a:t>
+              <a:t>12/4/2015</a:t>
             </a:fld>
             <a:endParaRPr lang="en-US" smtClean="0"/>
           </a:p>
@@ -9801,7 +9801,7 @@
           <a:p>
             <a:fld id="{82CC87A2-1781-440A-9FCF-DC78272C75A5}" type="datetime1">
               <a:rPr lang="en-US" smtClean="0"/>
-              <a:t>12/2/2015</a:t>
+              <a:t>12/4/2015</a:t>
             </a:fld>
             <a:endParaRPr lang="en-US" smtClean="0"/>
           </a:p>
@@ -10124,7 +10124,7 @@
           <a:p>
             <a:fld id="{82CC87A2-1781-440A-9FCF-DC78272C75A5}" type="datetime1">
               <a:rPr lang="en-US" smtClean="0"/>
-              <a:t>12/2/2015</a:t>
+              <a:t>12/4/2015</a:t>
             </a:fld>
             <a:endParaRPr lang="en-US" smtClean="0"/>
           </a:p>
@@ -10631,7 +10631,7 @@
           <a:p>
             <a:fld id="{82CC87A2-1781-440A-9FCF-DC78272C75A5}" type="datetime1">
               <a:rPr lang="en-US" smtClean="0"/>
-              <a:t>12/2/2015</a:t>
+              <a:t>12/4/2015</a:t>
             </a:fld>
             <a:endParaRPr lang="en-US" dirty="0" smtClean="0"/>
           </a:p>
@@ -11031,7 +11031,7 @@
           <a:p>
             <a:fld id="{82CC87A2-1781-440A-9FCF-DC78272C75A5}" type="datetime1">
               <a:rPr lang="en-US" smtClean="0"/>
-              <a:t>12/2/2015</a:t>
+              <a:t>12/4/2015</a:t>
             </a:fld>
             <a:endParaRPr lang="en-US" smtClean="0"/>
           </a:p>
@@ -11377,7 +11377,7 @@
           <a:p>
             <a:fld id="{82CC87A2-1781-440A-9FCF-DC78272C75A5}" type="datetime1">
               <a:rPr lang="en-US" smtClean="0"/>
-              <a:t>12/2/2015</a:t>
+              <a:t>12/4/2015</a:t>
             </a:fld>
             <a:endParaRPr lang="en-US" smtClean="0"/>
           </a:p>
@@ -11837,7 +11837,7 @@
           <a:p>
             <a:fld id="{594743C1-DE31-4E12-9F9F-1BA9DE6E7B96}" type="datetime1">
               <a:rPr lang="en-US" smtClean="0"/>
-              <a:t>12/2/2015</a:t>
+              <a:t>12/4/2015</a:t>
             </a:fld>
             <a:endParaRPr lang="en-US" dirty="0" smtClean="0"/>
           </a:p>
@@ -12456,7 +12456,7 @@
           <a:p>
             <a:fld id="{82CC87A2-1781-440A-9FCF-DC78272C75A5}" type="datetime1">
               <a:rPr lang="en-US" smtClean="0"/>
-              <a:t>12/2/2015</a:t>
+              <a:t>12/4/2015</a:t>
             </a:fld>
             <a:endParaRPr lang="en-US" smtClean="0"/>
           </a:p>
@@ -12895,7 +12895,7 @@
           <a:p>
             <a:fld id="{82CC87A2-1781-440A-9FCF-DC78272C75A5}" type="datetime1">
               <a:rPr lang="en-US" smtClean="0"/>
-              <a:t>12/2/2015</a:t>
+              <a:t>12/4/2015</a:t>
             </a:fld>
             <a:endParaRPr lang="en-US" smtClean="0"/>
           </a:p>
@@ -13493,7 +13493,7 @@
           <a:p>
             <a:fld id="{82CC87A2-1781-440A-9FCF-DC78272C75A5}" type="datetime1">
               <a:rPr lang="en-US" smtClean="0"/>
-              <a:t>12/2/2015</a:t>
+              <a:t>12/4/2015</a:t>
             </a:fld>
             <a:endParaRPr lang="en-US" smtClean="0"/>
           </a:p>
@@ -13900,7 +13900,7 @@
           <a:p>
             <a:fld id="{82CC87A2-1781-440A-9FCF-DC78272C75A5}" type="datetime1">
               <a:rPr lang="en-US" smtClean="0"/>
-              <a:t>12/2/2015</a:t>
+              <a:t>12/4/2015</a:t>
             </a:fld>
             <a:endParaRPr lang="en-US" smtClean="0"/>
           </a:p>
@@ -14244,7 +14244,7 @@
             </a:pPr>
             <a:fld id="{65B11A62-63AA-4067-ACEB-AA6A42CE3A38}" type="datetime1">
               <a:rPr lang="en-US" smtClean="0"/>
-              <a:t>12/2/2015</a:t>
+              <a:t>12/4/2015</a:t>
             </a:fld>
             <a:endParaRPr lang="en-US"/>
           </a:p>
@@ -14663,7 +14663,7 @@
             </a:pPr>
             <a:fld id="{65B11A62-63AA-4067-ACEB-AA6A42CE3A38}" type="datetime1">
               <a:rPr lang="en-US" smtClean="0"/>
-              <a:t>12/2/2015</a:t>
+              <a:t>12/4/2015</a:t>
             </a:fld>
             <a:endParaRPr lang="en-US" dirty="0"/>
           </a:p>
@@ -15117,7 +15117,7 @@
           <a:p>
             <a:fld id="{C4CD0F24-D883-406C-B918-66E9EB5E340B}" type="datetime1">
               <a:rPr lang="en-US" smtClean="0"/>
-              <a:t>12/2/2015</a:t>
+              <a:t>12/4/2015</a:t>
             </a:fld>
             <a:endParaRPr lang="en-US" smtClean="0"/>
           </a:p>
@@ -15649,7 +15649,7 @@
           <a:p>
             <a:fld id="{C3FB1654-67BB-4BFC-9431-2E9085587B48}" type="datetime1">
               <a:rPr lang="en-US" smtClean="0"/>
-              <a:t>12/2/2015</a:t>
+              <a:t>12/4/2015</a:t>
             </a:fld>
             <a:endParaRPr lang="en-US" smtClean="0"/>
           </a:p>
@@ -16404,7 +16404,7 @@
           <a:p>
             <a:fld id="{82CC87A2-1781-440A-9FCF-DC78272C75A5}" type="datetime1">
               <a:rPr lang="en-US" smtClean="0"/>
-              <a:t>12/2/2015</a:t>
+              <a:t>12/4/2015</a:t>
             </a:fld>
             <a:endParaRPr lang="en-US" smtClean="0"/>
           </a:p>
@@ -16869,11 +16869,7 @@
             </a:r>
             <a:r>
               <a:rPr lang="en-US" sz="1050" dirty="0" smtClean="0"/>
-              <a:t>character cell</a:t>
-            </a:r>
-            <a:r>
-              <a:rPr lang="en-US" sz="1050" dirty="0" smtClean="0"/>
-              <a:t>. </a:t>
+              <a:t>character cell. </a:t>
             </a:r>
             <a:r>
               <a:rPr lang="en-US" sz="1050" b="1" i="1" dirty="0" smtClean="0"/>
@@ -16903,7 +16899,6 @@
               <a:rPr lang="en-US" sz="1050" b="1" i="1" dirty="0" smtClean="0"/>
               <a:t>” method.</a:t>
             </a:r>
-            <a:endParaRPr lang="en-US" sz="1050" b="1" i="1" dirty="0" smtClean="0"/>
           </a:p>
           <a:p>
             <a:pPr lvl="2" eaLnBrk="1" hangingPunct="1"/>
@@ -16999,7 +16994,7 @@
           <a:p>
             <a:fld id="{A628D7B9-A196-43FB-98FC-214F3C36C725}" type="datetime1">
               <a:rPr lang="en-US" smtClean="0"/>
-              <a:t>12/2/2015</a:t>
+              <a:t>12/4/2015</a:t>
             </a:fld>
             <a:endParaRPr lang="en-US" dirty="0" smtClean="0"/>
           </a:p>
@@ -17304,11 +17299,15 @@
             </a:pPr>
             <a:r>
               <a:rPr lang="en-US" sz="1400" dirty="0" smtClean="0"/>
-              <a:t>Data such as “ID_ANY” via “</a:t>
+              <a:t>Data such as “ID_ANY” via </a:t>
+            </a:r>
+            <a:r>
+              <a:rPr lang="en-US" sz="1400" dirty="0" smtClean="0"/>
+              <a:t>“</a:t>
             </a:r>
             <a:r>
               <a:rPr lang="en-US" sz="1400" dirty="0" err="1" smtClean="0"/>
-              <a:t>wx,ID_ANY</a:t>
+              <a:t>wx.ID_ANY</a:t>
             </a:r>
             <a:r>
               <a:rPr lang="en-US" sz="1400" dirty="0" smtClean="0"/>
@@ -17571,11 +17570,15 @@
             </a:pPr>
             <a:r>
               <a:rPr lang="en-US" sz="1400" dirty="0"/>
-              <a:t>Data such as “ID_ANY” via “</a:t>
-            </a:r>
-            <a:r>
-              <a:rPr lang="en-US" sz="1400" dirty="0" err="1"/>
-              <a:t>wx,ID_ANY</a:t>
+              <a:t>Data such as “ID_ANY” via </a:t>
+            </a:r>
+            <a:r>
+              <a:rPr lang="en-US" sz="1400" dirty="0" smtClean="0"/>
+              <a:t>“</a:t>
+            </a:r>
+            <a:r>
+              <a:rPr lang="en-US" sz="1400" smtClean="0"/>
+              <a:t>wx.ID_ANY</a:t>
             </a:r>
             <a:r>
               <a:rPr lang="en-US" sz="1400" dirty="0"/>
@@ -17695,7 +17698,7 @@
           <a:p>
             <a:fld id="{82CC87A2-1781-440A-9FCF-DC78272C75A5}" type="datetime1">
               <a:rPr lang="en-US" smtClean="0"/>
-              <a:t>12/2/2015</a:t>
+              <a:t>12/4/2015</a:t>
             </a:fld>
             <a:endParaRPr lang="en-US" dirty="0" smtClean="0"/>
           </a:p>

</xml_diff>